<commit_message>
updated to documentation for version 1.2.2
</commit_message>
<xml_diff>
--- a/dependency-check.pptx
+++ b/dependency-check.pptx
@@ -246,7 +246,7 @@
             <a:fld id="{C0B153E1-1105-4E08-87A3-8410EB9E8CE1}" type="datetimeFigureOut">
               <a:rPr lang="nl-BE" smtClean="0"/>
               <a:pPr/>
-              <a:t>18/01/2014</a:t>
+              <a:t>8/05/2014</a:t>
             </a:fld>
             <a:endParaRPr lang="nl-BE"/>
           </a:p>
@@ -672,7 +672,7 @@
                 <a:latin typeface="Times New Roman" pitchFamily="18" charset="0"/>
               </a:rPr>
               <a:pPr eaLnBrk="1" hangingPunct="1"/>
-              <a:t>18 January 2014</a:t>
+              <a:t>08 May 2014</a:t>
             </a:fld>
             <a:endParaRPr lang="en-GB" dirty="0">
               <a:solidFill>
@@ -1412,7 +1412,7 @@
                 <a:latin typeface="Times New Roman" pitchFamily="18" charset="0"/>
               </a:rPr>
               <a:pPr eaLnBrk="1" hangingPunct="1"/>
-              <a:t>18 January 2014</a:t>
+              <a:t>08 May 2014</a:t>
             </a:fld>
             <a:endParaRPr lang="en-GB" dirty="0">
               <a:solidFill>
@@ -9423,8 +9423,13 @@
             </a:pPr>
             <a:r>
               <a:rPr lang="en-US" dirty="0" smtClean="0"/>
-              <a:t>Identifies CVE’s in Java libraries</a:t>
-            </a:r>
+              <a:t>Identifies CVE’s in Java </a:t>
+            </a:r>
+            <a:r>
+              <a:rPr lang="en-US" dirty="0" smtClean="0"/>
+              <a:t>and .NET libraries</a:t>
+            </a:r>
+            <a:endParaRPr lang="en-US" dirty="0" smtClean="0"/>
           </a:p>
           <a:p>
             <a:pPr eaLnBrk="1" hangingPunct="1">
@@ -9814,19 +9819,15 @@
             </a:pPr>
             <a:r>
               <a:rPr lang="en-US" dirty="0" smtClean="0"/>
-              <a:t>Additional analyzers for .NET </a:t>
-            </a:r>
-            <a:r>
-              <a:rPr lang="en-US" dirty="0" err="1" smtClean="0"/>
-              <a:t>dlls</a:t>
-            </a:r>
-            <a:r>
-              <a:rPr lang="en-US" dirty="0"/>
-              <a:t> </a:t>
+              <a:t>Additional analyzers </a:t>
             </a:r>
             <a:r>
               <a:rPr lang="en-US" dirty="0" smtClean="0"/>
-              <a:t>and JavaScript (</a:t>
+              <a:t>for JavaScript </a:t>
+            </a:r>
+            <a:r>
+              <a:rPr lang="en-US" dirty="0" smtClean="0"/>
+              <a:t>(</a:t>
             </a:r>
             <a:r>
               <a:rPr lang="en-US" dirty="0" err="1" smtClean="0"/>
@@ -10145,8 +10146,13 @@
             </a:pPr>
             <a:r>
               <a:rPr lang="en-US" dirty="0" smtClean="0"/>
-              <a:t>License - GNU GPL v3 license</a:t>
-            </a:r>
+              <a:t>License </a:t>
+            </a:r>
+            <a:r>
+              <a:rPr lang="en-US" dirty="0" smtClean="0"/>
+              <a:t>– Apache 2.0</a:t>
+            </a:r>
+            <a:endParaRPr lang="en-US" dirty="0" smtClean="0"/>
           </a:p>
           <a:p>
             <a:pPr>
@@ -11702,8 +11708,8 @@
         </p:nvSpPr>
         <p:spPr>
           <a:xfrm>
-            <a:off x="1271016" y="2587752"/>
-            <a:ext cx="11733784" cy="6384798"/>
+            <a:off x="1271016" y="2587751"/>
+            <a:ext cx="11733784" cy="6547517"/>
           </a:xfrm>
         </p:spPr>
         <p:txBody>
@@ -11736,7 +11742,15 @@
             </a:pPr>
             <a:r>
               <a:rPr lang="en-US" sz="3600" dirty="0" smtClean="0"/>
-              <a:t>Currently limited to Java libraries</a:t>
+              <a:t>Currently limited to </a:t>
+            </a:r>
+            <a:r>
+              <a:rPr lang="en-US" sz="3600" dirty="0" smtClean="0"/>
+              <a:t>Java &amp; .NET </a:t>
+            </a:r>
+            <a:r>
+              <a:rPr lang="en-US" sz="3600" dirty="0" smtClean="0"/>
+              <a:t>libraries</a:t>
             </a:r>
           </a:p>
           <a:p>
@@ -11764,8 +11778,31 @@
             </a:r>
             <a:r>
               <a:rPr lang="en-US" sz="3600" dirty="0" smtClean="0"/>
-              <a:t>ead developer/architect</a:t>
-            </a:r>
+              <a:t>ead </a:t>
+            </a:r>
+            <a:r>
+              <a:rPr lang="en-US" sz="3600" dirty="0" smtClean="0"/>
+              <a:t>developer/architect</a:t>
+            </a:r>
+          </a:p>
+          <a:p>
+            <a:pPr lvl="1">
+              <a:buFont typeface="Arial" pitchFamily="34" charset="0"/>
+              <a:buChar char="•"/>
+            </a:pPr>
+            <a:r>
+              <a:rPr lang="en-US" sz="3600" dirty="0"/>
+              <a:t>Will </a:t>
+            </a:r>
+            <a:r>
+              <a:rPr lang="en-US" sz="3600" dirty="0" err="1" smtClean="0"/>
+              <a:t>Stranathan</a:t>
+            </a:r>
+            <a:r>
+              <a:rPr lang="en-US" sz="3600" dirty="0" smtClean="0"/>
+              <a:t> - contributor</a:t>
+            </a:r>
+            <a:endParaRPr lang="en-US" sz="3600" dirty="0" smtClean="0"/>
           </a:p>
           <a:p>
             <a:pPr lvl="1">

</xml_diff>